<commit_message>
Setup economy setup matlab script
</commit_message>
<xml_diff>
--- a/Resources/Shattered Star System.pptx
+++ b/Resources/Shattered Star System.pptx
@@ -5,7 +5,7 @@
     <p:sldMasterId id="2147483648" r:id="rId1"/>
   </p:sldMasterIdLst>
   <p:notesMasterIdLst>
-    <p:notesMasterId r:id="rId11"/>
+    <p:notesMasterId r:id="rId12"/>
   </p:notesMasterIdLst>
   <p:sldIdLst>
     <p:sldId id="256" r:id="rId2"/>
@@ -17,6 +17,7 @@
     <p:sldId id="262" r:id="rId8"/>
     <p:sldId id="263" r:id="rId9"/>
     <p:sldId id="264" r:id="rId10"/>
+    <p:sldId id="265" r:id="rId11"/>
   </p:sldIdLst>
   <p:sldSz cx="9144000" cy="6858000" type="screen4x3"/>
   <p:notesSz cx="6858000" cy="9144000"/>
@@ -200,7 +201,7 @@
           <a:p>
             <a:fld id="{3F30B239-582C-4F26-AF59-DF758659A133}" type="datetimeFigureOut">
               <a:rPr lang="en-US" smtClean="0"/>
-              <a:t>3/6/2019</a:t>
+              <a:t>3/13/2019</a:t>
             </a:fld>
             <a:endParaRPr lang="en-US"/>
           </a:p>
@@ -1138,7 +1139,7 @@
           <a:p>
             <a:fld id="{9F75DD67-931E-46D9-941E-663230E739D5}" type="datetimeFigureOut">
               <a:rPr lang="en-US" smtClean="0"/>
-              <a:t>3/6/2019</a:t>
+              <a:t>3/13/2019</a:t>
             </a:fld>
             <a:endParaRPr lang="en-US"/>
           </a:p>
@@ -1308,7 +1309,7 @@
           <a:p>
             <a:fld id="{9F75DD67-931E-46D9-941E-663230E739D5}" type="datetimeFigureOut">
               <a:rPr lang="en-US" smtClean="0"/>
-              <a:t>3/6/2019</a:t>
+              <a:t>3/13/2019</a:t>
             </a:fld>
             <a:endParaRPr lang="en-US"/>
           </a:p>
@@ -1488,7 +1489,7 @@
           <a:p>
             <a:fld id="{9F75DD67-931E-46D9-941E-663230E739D5}" type="datetimeFigureOut">
               <a:rPr lang="en-US" smtClean="0"/>
-              <a:t>3/6/2019</a:t>
+              <a:t>3/13/2019</a:t>
             </a:fld>
             <a:endParaRPr lang="en-US"/>
           </a:p>
@@ -1658,7 +1659,7 @@
           <a:p>
             <a:fld id="{9F75DD67-931E-46D9-941E-663230E739D5}" type="datetimeFigureOut">
               <a:rPr lang="en-US" smtClean="0"/>
-              <a:t>3/6/2019</a:t>
+              <a:t>3/13/2019</a:t>
             </a:fld>
             <a:endParaRPr lang="en-US"/>
           </a:p>
@@ -1904,7 +1905,7 @@
           <a:p>
             <a:fld id="{9F75DD67-931E-46D9-941E-663230E739D5}" type="datetimeFigureOut">
               <a:rPr lang="en-US" smtClean="0"/>
-              <a:t>3/6/2019</a:t>
+              <a:t>3/13/2019</a:t>
             </a:fld>
             <a:endParaRPr lang="en-US"/>
           </a:p>
@@ -2192,7 +2193,7 @@
           <a:p>
             <a:fld id="{9F75DD67-931E-46D9-941E-663230E739D5}" type="datetimeFigureOut">
               <a:rPr lang="en-US" smtClean="0"/>
-              <a:t>3/6/2019</a:t>
+              <a:t>3/13/2019</a:t>
             </a:fld>
             <a:endParaRPr lang="en-US"/>
           </a:p>
@@ -2614,7 +2615,7 @@
           <a:p>
             <a:fld id="{9F75DD67-931E-46D9-941E-663230E739D5}" type="datetimeFigureOut">
               <a:rPr lang="en-US" smtClean="0"/>
-              <a:t>3/6/2019</a:t>
+              <a:t>3/13/2019</a:t>
             </a:fld>
             <a:endParaRPr lang="en-US"/>
           </a:p>
@@ -2732,7 +2733,7 @@
           <a:p>
             <a:fld id="{9F75DD67-931E-46D9-941E-663230E739D5}" type="datetimeFigureOut">
               <a:rPr lang="en-US" smtClean="0"/>
-              <a:t>3/6/2019</a:t>
+              <a:t>3/13/2019</a:t>
             </a:fld>
             <a:endParaRPr lang="en-US"/>
           </a:p>
@@ -2827,7 +2828,7 @@
           <a:p>
             <a:fld id="{9F75DD67-931E-46D9-941E-663230E739D5}" type="datetimeFigureOut">
               <a:rPr lang="en-US" smtClean="0"/>
-              <a:t>3/6/2019</a:t>
+              <a:t>3/13/2019</a:t>
             </a:fld>
             <a:endParaRPr lang="en-US"/>
           </a:p>
@@ -3104,7 +3105,7 @@
           <a:p>
             <a:fld id="{9F75DD67-931E-46D9-941E-663230E739D5}" type="datetimeFigureOut">
               <a:rPr lang="en-US" smtClean="0"/>
-              <a:t>3/6/2019</a:t>
+              <a:t>3/13/2019</a:t>
             </a:fld>
             <a:endParaRPr lang="en-US"/>
           </a:p>
@@ -3357,7 +3358,7 @@
           <a:p>
             <a:fld id="{9F75DD67-931E-46D9-941E-663230E739D5}" type="datetimeFigureOut">
               <a:rPr lang="en-US" smtClean="0"/>
-              <a:t>3/6/2019</a:t>
+              <a:t>3/13/2019</a:t>
             </a:fld>
             <a:endParaRPr lang="en-US"/>
           </a:p>
@@ -3570,7 +3571,7 @@
           <a:p>
             <a:fld id="{9F75DD67-931E-46D9-941E-663230E739D5}" type="datetimeFigureOut">
               <a:rPr lang="en-US" smtClean="0"/>
-              <a:t>3/6/2019</a:t>
+              <a:t>3/13/2019</a:t>
             </a:fld>
             <a:endParaRPr lang="en-US"/>
           </a:p>
@@ -3996,6 +3997,128 @@
 </p:sld>
 </file>
 
+<file path=ppt/slides/slide10.xml><?xml version="1.0" encoding="utf-8"?>
+<p:sld xmlns:a="http://schemas.openxmlformats.org/drawingml/2006/main" xmlns:r="http://schemas.openxmlformats.org/officeDocument/2006/relationships" xmlns:p="http://schemas.openxmlformats.org/presentationml/2006/main">
+  <p:cSld>
+    <p:spTree>
+      <p:nvGrpSpPr>
+        <p:cNvPr id="1" name=""/>
+        <p:cNvGrpSpPr/>
+        <p:nvPr/>
+      </p:nvGrpSpPr>
+      <p:grpSpPr>
+        <a:xfrm>
+          <a:off x="0" y="0"/>
+          <a:ext cx="0" cy="0"/>
+          <a:chOff x="0" y="0"/>
+          <a:chExt cx="0" cy="0"/>
+        </a:xfrm>
+      </p:grpSpPr>
+      <p:sp>
+        <p:nvSpPr>
+          <p:cNvPr id="2" name="Title 1"/>
+          <p:cNvSpPr>
+            <a:spLocks noGrp="1"/>
+          </p:cNvSpPr>
+          <p:nvPr>
+            <p:ph type="title"/>
+          </p:nvPr>
+        </p:nvSpPr>
+        <p:spPr/>
+        <p:txBody>
+          <a:bodyPr/>
+          <a:lstStyle/>
+          <a:p>
+            <a:endParaRPr lang="en-US"/>
+          </a:p>
+        </p:txBody>
+      </p:sp>
+      <p:sp>
+        <p:nvSpPr>
+          <p:cNvPr id="3" name="Content Placeholder 2"/>
+          <p:cNvSpPr>
+            <a:spLocks noGrp="1"/>
+          </p:cNvSpPr>
+          <p:nvPr>
+            <p:ph idx="1"/>
+          </p:nvPr>
+        </p:nvSpPr>
+        <p:spPr/>
+        <p:txBody>
+          <a:bodyPr/>
+          <a:lstStyle/>
+          <a:p>
+            <a:endParaRPr lang="en-US"/>
+          </a:p>
+        </p:txBody>
+      </p:sp>
+      <p:pic>
+        <p:nvPicPr>
+          <p:cNvPr id="2050" name="Picture 2"/>
+          <p:cNvPicPr>
+            <a:picLocks noChangeAspect="1" noChangeArrowheads="1"/>
+          </p:cNvPicPr>
+          <p:nvPr/>
+        </p:nvPicPr>
+        <p:blipFill>
+          <a:blip r:embed="rId2">
+            <a:extLst>
+              <a:ext uri="{28A0092B-C50C-407E-A947-70E740481C1C}">
+                <a14:useLocalDpi xmlns:a14="http://schemas.microsoft.com/office/drawing/2010/main" val="0"/>
+              </a:ext>
+            </a:extLst>
+          </a:blip>
+          <a:srcRect/>
+          <a:stretch>
+            <a:fillRect/>
+          </a:stretch>
+        </p:blipFill>
+        <p:spPr bwMode="auto">
+          <a:xfrm>
+            <a:off x="0" y="1523999"/>
+            <a:ext cx="8809923" cy="4943475"/>
+          </a:xfrm>
+          <a:prstGeom prst="rect">
+            <a:avLst/>
+          </a:prstGeom>
+          <a:noFill/>
+          <a:ln>
+            <a:noFill/>
+          </a:ln>
+          <a:extLst>
+            <a:ext uri="{909E8E84-426E-40DD-AFC4-6F175D3DCCD1}">
+              <a14:hiddenFill xmlns:a14="http://schemas.microsoft.com/office/drawing/2010/main">
+                <a:solidFill>
+                  <a:schemeClr val="accent1"/>
+                </a:solidFill>
+              </a14:hiddenFill>
+            </a:ext>
+            <a:ext uri="{91240B29-F687-4F45-9708-019B960494DF}">
+              <a14:hiddenLine xmlns:a14="http://schemas.microsoft.com/office/drawing/2010/main" w="9525">
+                <a:solidFill>
+                  <a:schemeClr val="tx1"/>
+                </a:solidFill>
+                <a:miter lim="800000"/>
+                <a:headEnd/>
+                <a:tailEnd/>
+              </a14:hiddenLine>
+            </a:ext>
+          </a:extLst>
+        </p:spPr>
+      </p:pic>
+    </p:spTree>
+    <p:extLst>
+      <p:ext uri="{BB962C8B-B14F-4D97-AF65-F5344CB8AC3E}">
+        <p14:creationId xmlns:p14="http://schemas.microsoft.com/office/powerpoint/2010/main" val="3890020708"/>
+      </p:ext>
+    </p:extLst>
+  </p:cSld>
+  <p:clrMapOvr>
+    <a:masterClrMapping/>
+  </p:clrMapOvr>
+</p:sld>
+</file>
+
 <file path=ppt/slides/slide2.xml><?xml version="1.0" encoding="utf-8"?>
 <p:sld xmlns:a="http://schemas.openxmlformats.org/drawingml/2006/main" xmlns:r="http://schemas.openxmlformats.org/officeDocument/2006/relationships" xmlns:p="http://schemas.openxmlformats.org/presentationml/2006/main">
   <p:cSld>
@@ -8405,15 +8528,7 @@
                   <a:srgbClr val="9A0000"/>
                 </a:solidFill>
               </a:rPr>
-              <a:t>Buy </a:t>
-            </a:r>
-            <a:r>
-              <a:rPr lang="en-US" sz="1400" b="1" dirty="0" smtClean="0">
-                <a:solidFill>
-                  <a:srgbClr val="9A0000"/>
-                </a:solidFill>
-              </a:rPr>
-              <a:t>Munitions</a:t>
+              <a:t>Buy Munitions</a:t>
             </a:r>
           </a:p>
           <a:p>
@@ -9697,15 +9812,7 @@
                   <a:schemeClr val="bg1"/>
                 </a:solidFill>
               </a:rPr>
-              <a:t>Asteroid </a:t>
-            </a:r>
-            <a:r>
-              <a:rPr lang="en-US" sz="1100" b="1" dirty="0" smtClean="0">
-                <a:solidFill>
-                  <a:schemeClr val="bg1"/>
-                </a:solidFill>
-              </a:rPr>
-              <a:t>Field B</a:t>
+              <a:t>Asteroid Field B</a:t>
             </a:r>
             <a:endParaRPr lang="en-US" sz="1100" b="1" dirty="0">
               <a:solidFill>
@@ -10132,15 +10239,7 @@
                   <a:schemeClr val="bg1"/>
                 </a:solidFill>
               </a:rPr>
-              <a:t>Asteroid </a:t>
-            </a:r>
-            <a:r>
-              <a:rPr lang="en-US" sz="1100" b="1" dirty="0" smtClean="0">
-                <a:solidFill>
-                  <a:schemeClr val="bg1"/>
-                </a:solidFill>
-              </a:rPr>
-              <a:t>Field A</a:t>
+              <a:t>Asteroid Field A</a:t>
             </a:r>
             <a:endParaRPr lang="en-US" sz="1100" b="1" dirty="0">
               <a:solidFill>
@@ -10218,15 +10317,7 @@
                   <a:schemeClr val="bg1"/>
                 </a:solidFill>
               </a:rPr>
-              <a:t>Asteroid </a:t>
-            </a:r>
-            <a:r>
-              <a:rPr lang="en-US" sz="1100" b="1" dirty="0" smtClean="0">
-                <a:solidFill>
-                  <a:schemeClr val="bg1"/>
-                </a:solidFill>
-              </a:rPr>
-              <a:t>Field C</a:t>
+              <a:t>Asteroid Field C</a:t>
             </a:r>
             <a:endParaRPr lang="en-US" sz="1100" b="1" dirty="0">
               <a:solidFill>
@@ -10276,6 +10367,66 @@
           <a:p>
             <a:pPr algn="ctr"/>
             <a:endParaRPr lang="en-US"/>
+          </a:p>
+        </p:txBody>
+      </p:sp>
+      <p:sp>
+        <p:nvSpPr>
+          <p:cNvPr id="2" name="TextBox 1"/>
+          <p:cNvSpPr txBox="1"/>
+          <p:nvPr/>
+        </p:nvSpPr>
+        <p:spPr>
+          <a:xfrm>
+            <a:off x="4381454" y="4190999"/>
+            <a:ext cx="457200" cy="276999"/>
+          </a:xfrm>
+          <a:prstGeom prst="rect">
+            <a:avLst/>
+          </a:prstGeom>
+          <a:noFill/>
+        </p:spPr>
+        <p:txBody>
+          <a:bodyPr wrap="square" rtlCol="0">
+            <a:spAutoFit/>
+          </a:bodyPr>
+          <a:lstStyle/>
+          <a:p>
+            <a:r>
+              <a:rPr lang="en-US" sz="1200" dirty="0" smtClean="0"/>
+              <a:t>0,0</a:t>
+            </a:r>
+            <a:endParaRPr lang="en-US" sz="1200" dirty="0"/>
+          </a:p>
+        </p:txBody>
+      </p:sp>
+      <p:sp>
+        <p:nvSpPr>
+          <p:cNvPr id="31" name="TextBox 30"/>
+          <p:cNvSpPr txBox="1"/>
+          <p:nvPr/>
+        </p:nvSpPr>
+        <p:spPr>
+          <a:xfrm>
+            <a:off x="4061456" y="2391750"/>
+            <a:ext cx="712472" cy="276999"/>
+          </a:xfrm>
+          <a:prstGeom prst="rect">
+            <a:avLst/>
+          </a:prstGeom>
+          <a:noFill/>
+        </p:spPr>
+        <p:txBody>
+          <a:bodyPr wrap="square" rtlCol="0">
+            <a:spAutoFit/>
+          </a:bodyPr>
+          <a:lstStyle/>
+          <a:p>
+            <a:r>
+              <a:rPr lang="en-US" sz="1200" dirty="0" smtClean="0"/>
+              <a:t>0,1000</a:t>
+            </a:r>
+            <a:endParaRPr lang="en-US" sz="1200" dirty="0"/>
           </a:p>
         </p:txBody>
       </p:sp>
@@ -11391,17 +11542,7 @@
                   </a:schemeClr>
                 </a:solidFill>
               </a:rPr>
-              <a:t>SOI </a:t>
-            </a:r>
-            <a:r>
-              <a:rPr lang="en-US" dirty="0" smtClean="0">
-                <a:solidFill>
-                  <a:schemeClr val="bg1">
-                    <a:lumMod val="95000"/>
-                  </a:schemeClr>
-                </a:solidFill>
-              </a:rPr>
-              <a:t>3</a:t>
+              <a:t>SOI 3</a:t>
             </a:r>
             <a:endParaRPr lang="en-US" dirty="0">
               <a:solidFill>
@@ -11455,6 +11596,41 @@
               </a:rPr>
               <a:t>2</a:t>
             </a:r>
+          </a:p>
+        </p:txBody>
+      </p:sp>
+      <p:sp>
+        <p:nvSpPr>
+          <p:cNvPr id="48" name="TextBox 47"/>
+          <p:cNvSpPr txBox="1"/>
+          <p:nvPr/>
+        </p:nvSpPr>
+        <p:spPr>
+          <a:xfrm>
+            <a:off x="7848600" y="3892425"/>
+            <a:ext cx="883422" cy="369332"/>
+          </a:xfrm>
+          <a:prstGeom prst="rect">
+            <a:avLst/>
+          </a:prstGeom>
+          <a:noFill/>
+        </p:spPr>
+        <p:txBody>
+          <a:bodyPr wrap="square" rtlCol="0">
+            <a:spAutoFit/>
+          </a:bodyPr>
+          <a:lstStyle/>
+          <a:p>
+            <a:r>
+              <a:rPr lang="en-US" dirty="0" smtClean="0">
+                <a:solidFill>
+                  <a:schemeClr val="bg1">
+                    <a:lumMod val="95000"/>
+                  </a:schemeClr>
+                </a:solidFill>
+              </a:rPr>
+              <a:t>SOI 4</a:t>
+            </a:r>
             <a:endParaRPr lang="en-US" dirty="0">
               <a:solidFill>
                 <a:schemeClr val="bg1">
@@ -11467,14 +11643,14 @@
       </p:sp>
       <p:sp>
         <p:nvSpPr>
-          <p:cNvPr id="48" name="TextBox 47"/>
+          <p:cNvPr id="49" name="TextBox 48"/>
           <p:cNvSpPr txBox="1"/>
           <p:nvPr/>
         </p:nvSpPr>
         <p:spPr>
           <a:xfrm>
-            <a:off x="7848600" y="3892425"/>
-            <a:ext cx="883422" cy="369332"/>
+            <a:off x="4217347" y="4709142"/>
+            <a:ext cx="1508512" cy="369332"/>
           </a:xfrm>
           <a:prstGeom prst="rect">
             <a:avLst/>
@@ -11487,6 +11663,7 @@
           </a:bodyPr>
           <a:lstStyle/>
           <a:p>
+            <a:pPr algn="ctr"/>
             <a:r>
               <a:rPr lang="en-US" dirty="0" smtClean="0">
                 <a:solidFill>
@@ -11495,70 +11672,7 @@
                   </a:schemeClr>
                 </a:solidFill>
               </a:rPr>
-              <a:t>SOI </a:t>
-            </a:r>
-            <a:r>
-              <a:rPr lang="en-US" dirty="0" smtClean="0">
-                <a:solidFill>
-                  <a:schemeClr val="bg1">
-                    <a:lumMod val="95000"/>
-                  </a:schemeClr>
-                </a:solidFill>
-              </a:rPr>
-              <a:t>4</a:t>
-            </a:r>
-            <a:endParaRPr lang="en-US" dirty="0">
-              <a:solidFill>
-                <a:schemeClr val="bg1">
-                  <a:lumMod val="95000"/>
-                </a:schemeClr>
-              </a:solidFill>
-            </a:endParaRPr>
-          </a:p>
-        </p:txBody>
-      </p:sp>
-      <p:sp>
-        <p:nvSpPr>
-          <p:cNvPr id="49" name="TextBox 48"/>
-          <p:cNvSpPr txBox="1"/>
-          <p:nvPr/>
-        </p:nvSpPr>
-        <p:spPr>
-          <a:xfrm>
-            <a:off x="4217347" y="4709142"/>
-            <a:ext cx="1508512" cy="369332"/>
-          </a:xfrm>
-          <a:prstGeom prst="rect">
-            <a:avLst/>
-          </a:prstGeom>
-          <a:noFill/>
-        </p:spPr>
-        <p:txBody>
-          <a:bodyPr wrap="square" rtlCol="0">
-            <a:spAutoFit/>
-          </a:bodyPr>
-          <a:lstStyle/>
-          <a:p>
-            <a:pPr algn="ctr"/>
-            <a:r>
-              <a:rPr lang="en-US" dirty="0" smtClean="0">
-                <a:solidFill>
-                  <a:schemeClr val="bg1">
-                    <a:lumMod val="95000"/>
-                  </a:schemeClr>
-                </a:solidFill>
-              </a:rPr>
-              <a:t>Neutral </a:t>
-            </a:r>
-            <a:r>
-              <a:rPr lang="en-US" dirty="0" smtClean="0">
-                <a:solidFill>
-                  <a:schemeClr val="bg1">
-                    <a:lumMod val="95000"/>
-                  </a:schemeClr>
-                </a:solidFill>
-              </a:rPr>
-              <a:t>Zone</a:t>
+              <a:t>Neutral Zone</a:t>
             </a:r>
             <a:endParaRPr lang="en-US" dirty="0">
               <a:solidFill>
@@ -12179,15 +12293,7 @@
                   <a:schemeClr val="bg1"/>
                 </a:solidFill>
               </a:rPr>
-              <a:t>Asteroid </a:t>
-            </a:r>
-            <a:r>
-              <a:rPr lang="en-US" sz="1100" b="1" dirty="0" smtClean="0">
-                <a:solidFill>
-                  <a:schemeClr val="bg1"/>
-                </a:solidFill>
-              </a:rPr>
-              <a:t>Field B</a:t>
+              <a:t>Asteroid Field B</a:t>
             </a:r>
             <a:endParaRPr lang="en-US" sz="1100" b="1" dirty="0">
               <a:solidFill>
@@ -12614,15 +12720,7 @@
                   <a:schemeClr val="bg1"/>
                 </a:solidFill>
               </a:rPr>
-              <a:t>Asteroid </a:t>
-            </a:r>
-            <a:r>
-              <a:rPr lang="en-US" sz="1100" b="1" dirty="0" smtClean="0">
-                <a:solidFill>
-                  <a:schemeClr val="bg1"/>
-                </a:solidFill>
-              </a:rPr>
-              <a:t>Field A</a:t>
+              <a:t>Asteroid Field A</a:t>
             </a:r>
             <a:endParaRPr lang="en-US" sz="1100" b="1" dirty="0">
               <a:solidFill>
@@ -12700,15 +12798,7 @@
                   <a:schemeClr val="bg1"/>
                 </a:solidFill>
               </a:rPr>
-              <a:t>Asteroid </a:t>
-            </a:r>
-            <a:r>
-              <a:rPr lang="en-US" sz="1100" b="1" dirty="0" smtClean="0">
-                <a:solidFill>
-                  <a:schemeClr val="bg1"/>
-                </a:solidFill>
-              </a:rPr>
-              <a:t>Field C</a:t>
+              <a:t>Asteroid Field C</a:t>
             </a:r>
             <a:endParaRPr lang="en-US" sz="1100" b="1" dirty="0">
               <a:solidFill>
@@ -13301,11 +13391,6 @@
               </a:rPr>
               <a:t>Resource Distribution</a:t>
             </a:r>
-            <a:endParaRPr lang="en-US" sz="2800" dirty="0">
-              <a:solidFill>
-                <a:srgbClr val="F89006"/>
-              </a:solidFill>
-            </a:endParaRPr>
           </a:p>
         </p:txBody>
       </p:sp>
@@ -13624,15 +13709,7 @@
                   <a:schemeClr val="bg1"/>
                 </a:solidFill>
               </a:rPr>
-              <a:t>Asteroid </a:t>
-            </a:r>
-            <a:r>
-              <a:rPr lang="en-US" sz="1100" b="1" dirty="0" smtClean="0">
-                <a:solidFill>
-                  <a:schemeClr val="bg1"/>
-                </a:solidFill>
-              </a:rPr>
-              <a:t>Field B</a:t>
+              <a:t>Asteroid Field B</a:t>
             </a:r>
             <a:endParaRPr lang="en-US" sz="1100" b="1" dirty="0">
               <a:solidFill>
@@ -14059,15 +14136,7 @@
                   <a:schemeClr val="bg1"/>
                 </a:solidFill>
               </a:rPr>
-              <a:t>Asteroid </a:t>
-            </a:r>
-            <a:r>
-              <a:rPr lang="en-US" sz="1100" b="1" dirty="0" smtClean="0">
-                <a:solidFill>
-                  <a:schemeClr val="bg1"/>
-                </a:solidFill>
-              </a:rPr>
-              <a:t>Field A</a:t>
+              <a:t>Asteroid Field A</a:t>
             </a:r>
             <a:endParaRPr lang="en-US" sz="1100" b="1" dirty="0">
               <a:solidFill>
@@ -14145,15 +14214,7 @@
                   <a:schemeClr val="bg1"/>
                 </a:solidFill>
               </a:rPr>
-              <a:t>Asteroid </a:t>
-            </a:r>
-            <a:r>
-              <a:rPr lang="en-US" sz="1100" b="1" dirty="0" smtClean="0">
-                <a:solidFill>
-                  <a:schemeClr val="bg1"/>
-                </a:solidFill>
-              </a:rPr>
-              <a:t>Field C</a:t>
+              <a:t>Asteroid Field C</a:t>
             </a:r>
             <a:endParaRPr lang="en-US" sz="1100" b="1" dirty="0">
               <a:solidFill>

</xml_diff>